<commit_message>
Fixed file names due to https://www.drupal.org/node/2302893
</commit_message>
<xml_diff>
--- a/src/flagOnD8.pptx
+++ b/src/flagOnD8.pptx
@@ -346,7 +346,7 @@
           <a:p>
             <a:fld id="{98AEBF78-ABB6-9F42-87DB-0ECE75CB3E53}" type="datetimeFigureOut">
               <a:rPr lang="en-US" smtClean="0"/>
-              <a:t>7/17/14</a:t>
+              <a:t>7/18/14</a:t>
             </a:fld>
             <a:endParaRPr lang="en-US"/>
           </a:p>
@@ -516,7 +516,7 @@
           <a:p>
             <a:fld id="{98AEBF78-ABB6-9F42-87DB-0ECE75CB3E53}" type="datetimeFigureOut">
               <a:rPr lang="en-US" smtClean="0"/>
-              <a:t>7/17/14</a:t>
+              <a:t>7/18/14</a:t>
             </a:fld>
             <a:endParaRPr lang="en-US"/>
           </a:p>
@@ -696,7 +696,7 @@
           <a:p>
             <a:fld id="{98AEBF78-ABB6-9F42-87DB-0ECE75CB3E53}" type="datetimeFigureOut">
               <a:rPr lang="en-US" smtClean="0"/>
-              <a:t>7/17/14</a:t>
+              <a:t>7/18/14</a:t>
             </a:fld>
             <a:endParaRPr lang="en-US"/>
           </a:p>
@@ -870,7 +870,7 @@
           <a:p>
             <a:fld id="{98AEBF78-ABB6-9F42-87DB-0ECE75CB3E53}" type="datetimeFigureOut">
               <a:rPr lang="en-US" smtClean="0"/>
-              <a:t>7/17/14</a:t>
+              <a:t>7/18/14</a:t>
             </a:fld>
             <a:endParaRPr lang="en-US"/>
           </a:p>
@@ -1116,7 +1116,7 @@
           <a:p>
             <a:fld id="{98AEBF78-ABB6-9F42-87DB-0ECE75CB3E53}" type="datetimeFigureOut">
               <a:rPr lang="en-US" smtClean="0"/>
-              <a:t>7/17/14</a:t>
+              <a:t>7/18/14</a:t>
             </a:fld>
             <a:endParaRPr lang="en-US"/>
           </a:p>
@@ -1404,7 +1404,7 @@
           <a:p>
             <a:fld id="{98AEBF78-ABB6-9F42-87DB-0ECE75CB3E53}" type="datetimeFigureOut">
               <a:rPr lang="en-US" smtClean="0"/>
-              <a:t>7/17/14</a:t>
+              <a:t>7/18/14</a:t>
             </a:fld>
             <a:endParaRPr lang="en-US"/>
           </a:p>
@@ -1826,7 +1826,7 @@
           <a:p>
             <a:fld id="{98AEBF78-ABB6-9F42-87DB-0ECE75CB3E53}" type="datetimeFigureOut">
               <a:rPr lang="en-US" smtClean="0"/>
-              <a:t>7/17/14</a:t>
+              <a:t>7/18/14</a:t>
             </a:fld>
             <a:endParaRPr lang="en-US"/>
           </a:p>
@@ -1944,7 +1944,7 @@
           <a:p>
             <a:fld id="{98AEBF78-ABB6-9F42-87DB-0ECE75CB3E53}" type="datetimeFigureOut">
               <a:rPr lang="en-US" smtClean="0"/>
-              <a:t>7/17/14</a:t>
+              <a:t>7/18/14</a:t>
             </a:fld>
             <a:endParaRPr lang="en-US"/>
           </a:p>
@@ -2039,7 +2039,7 @@
           <a:p>
             <a:fld id="{98AEBF78-ABB6-9F42-87DB-0ECE75CB3E53}" type="datetimeFigureOut">
               <a:rPr lang="en-US" smtClean="0"/>
-              <a:t>7/17/14</a:t>
+              <a:t>7/18/14</a:t>
             </a:fld>
             <a:endParaRPr lang="en-US"/>
           </a:p>
@@ -2316,7 +2316,7 @@
           <a:p>
             <a:fld id="{98AEBF78-ABB6-9F42-87DB-0ECE75CB3E53}" type="datetimeFigureOut">
               <a:rPr lang="en-US" smtClean="0"/>
-              <a:t>7/17/14</a:t>
+              <a:t>7/18/14</a:t>
             </a:fld>
             <a:endParaRPr lang="en-US"/>
           </a:p>
@@ -2569,7 +2569,7 @@
           <a:p>
             <a:fld id="{98AEBF78-ABB6-9F42-87DB-0ECE75CB3E53}" type="datetimeFigureOut">
               <a:rPr lang="en-US" smtClean="0"/>
-              <a:t>7/17/14</a:t>
+              <a:t>7/18/14</a:t>
             </a:fld>
             <a:endParaRPr lang="en-US"/>
           </a:p>
@@ -3075,7 +3075,7 @@
           <a:p>
             <a:fld id="{98AEBF78-ABB6-9F42-87DB-0ECE75CB3E53}" type="datetimeFigureOut">
               <a:rPr lang="en-US" smtClean="0"/>
-              <a:t>7/17/14</a:t>
+              <a:t>7/18/14</a:t>
             </a:fld>
             <a:endParaRPr lang="en-US"/>
           </a:p>
@@ -13515,7 +13515,7 @@
                 <a:latin typeface="Anime Ace 2.0 BB"/>
                 <a:cs typeface="Anime Ace 2.0 BB"/>
               </a:rPr>
-              <a:t>Flag.menu_links.yml</a:t>
+              <a:t>Flag.links.menu.yml</a:t>
             </a:r>
             <a:endParaRPr lang="en-US" sz="1200" dirty="0">
               <a:latin typeface="Anime Ace 2.0 BB"/>
@@ -14167,11 +14167,11 @@
           <a:p>
             <a:pPr algn="ctr"/>
             <a:r>
-              <a:rPr lang="en-US" sz="1200" dirty="0" err="1" smtClean="0">
-                <a:latin typeface="Anime Ace 2.0 BB"/>
-                <a:cs typeface="Anime Ace 2.0 BB"/>
-              </a:rPr>
-              <a:t>Flag.menu_links.yml</a:t>
+              <a:rPr lang="en-US" sz="1200" dirty="0" err="1">
+                <a:latin typeface="Anime Ace 2.0 BB"/>
+                <a:cs typeface="Anime Ace 2.0 BB"/>
+              </a:rPr>
+              <a:t>Flag.links.menu.yml</a:t>
             </a:r>
             <a:endParaRPr lang="en-US" sz="1200" dirty="0">
               <a:latin typeface="Anime Ace 2.0 BB"/>
@@ -14231,7 +14231,7 @@
           <p:nvPr>
             <p:extLst>
               <p:ext uri="{D42A27DB-BD31-4B8C-83A1-F6EECF244321}">
-                <p14:modId xmlns:p14="http://schemas.microsoft.com/office/powerpoint/2010/main" val="3959296072"/>
+                <p14:modId xmlns:p14="http://schemas.microsoft.com/office/powerpoint/2010/main" val="2176487232"/>
               </p:ext>
             </p:extLst>
           </p:nvPr>
@@ -15174,11 +15174,11 @@
           <a:p>
             <a:pPr algn="ctr"/>
             <a:r>
-              <a:rPr lang="en-US" sz="1200" dirty="0" err="1" smtClean="0">
-                <a:latin typeface="Anime Ace 2.0 BB"/>
-                <a:cs typeface="Anime Ace 2.0 BB"/>
-              </a:rPr>
-              <a:t>Flag.menu_links.yml</a:t>
+              <a:rPr lang="en-US" sz="1200" dirty="0" err="1">
+                <a:latin typeface="Anime Ace 2.0 BB"/>
+                <a:cs typeface="Anime Ace 2.0 BB"/>
+              </a:rPr>
+              <a:t>Flag.links.menu.yml</a:t>
             </a:r>
             <a:endParaRPr lang="en-US" sz="1200" dirty="0">
               <a:latin typeface="Anime Ace 2.0 BB"/>
@@ -15306,7 +15306,7 @@
                 <a:latin typeface="Anime Ace 2.0 BB"/>
                 <a:cs typeface="Anime Ace 2.0 BB"/>
               </a:rPr>
-              <a:t>Flag.Local_ACTIONs.yml</a:t>
+              <a:t>Flag.links.ACTION.yml</a:t>
             </a:r>
             <a:endParaRPr lang="en-US" sz="1200" dirty="0">
               <a:latin typeface="Anime Ace 2.0 BB"/>
@@ -15856,11 +15856,11 @@
           <a:p>
             <a:pPr algn="ctr"/>
             <a:r>
-              <a:rPr lang="en-US" sz="1200" dirty="0" err="1" smtClean="0">
-                <a:latin typeface="Anime Ace 2.0 BB"/>
-                <a:cs typeface="Anime Ace 2.0 BB"/>
-              </a:rPr>
-              <a:t>Flag.menu_links.yml</a:t>
+              <a:rPr lang="en-US" sz="1200" dirty="0" err="1">
+                <a:latin typeface="Anime Ace 2.0 BB"/>
+                <a:cs typeface="Anime Ace 2.0 BB"/>
+              </a:rPr>
+              <a:t>Flag.links.menu.yml</a:t>
             </a:r>
             <a:endParaRPr lang="en-US" sz="1200" dirty="0">
               <a:latin typeface="Anime Ace 2.0 BB"/>
@@ -15933,11 +15933,11 @@
           <a:p>
             <a:pPr algn="ctr"/>
             <a:r>
-              <a:rPr lang="en-US" sz="1200" dirty="0" err="1" smtClean="0">
-                <a:latin typeface="Anime Ace 2.0 BB"/>
-                <a:cs typeface="Anime Ace 2.0 BB"/>
-              </a:rPr>
-              <a:t>Flag.Local_ACTIONs.yml</a:t>
+              <a:rPr lang="en-US" sz="1200" dirty="0" err="1">
+                <a:latin typeface="Anime Ace 2.0 BB"/>
+                <a:cs typeface="Anime Ace 2.0 BB"/>
+              </a:rPr>
+              <a:t>Flag.links.ACTION.yml</a:t>
             </a:r>
             <a:endParaRPr lang="en-US" sz="1200" dirty="0">
               <a:latin typeface="Anime Ace 2.0 BB"/>
@@ -15997,7 +15997,7 @@
           <p:nvPr>
             <p:extLst>
               <p:ext uri="{D42A27DB-BD31-4B8C-83A1-F6EECF244321}">
-                <p14:modId xmlns:p14="http://schemas.microsoft.com/office/powerpoint/2010/main" val="3382758288"/>
+                <p14:modId xmlns:p14="http://schemas.microsoft.com/office/powerpoint/2010/main" val="3105167296"/>
               </p:ext>
             </p:extLst>
           </p:nvPr>

</xml_diff>

<commit_message>
Removed blob graphic, replaced with custom art.
</commit_message>
<xml_diff>
--- a/src/flagOnD8.pptx
+++ b/src/flagOnD8.pptx
@@ -19,7 +19,7 @@
     <p:sldId id="269" r:id="rId13"/>
     <p:sldId id="266" r:id="rId14"/>
     <p:sldId id="265" r:id="rId15"/>
-    <p:sldId id="271" r:id="rId16"/>
+    <p:sldId id="345" r:id="rId16"/>
     <p:sldId id="274" r:id="rId17"/>
     <p:sldId id="272" r:id="rId18"/>
     <p:sldId id="275" r:id="rId19"/>
@@ -361,7 +361,7 @@
           <a:p>
             <a:fld id="{98AEBF78-ABB6-9F42-87DB-0ECE75CB3E53}" type="datetimeFigureOut">
               <a:rPr lang="en-US" smtClean="0"/>
-              <a:t>5/4/15</a:t>
+              <a:t>5/6/15</a:t>
             </a:fld>
             <a:endParaRPr lang="en-US"/>
           </a:p>
@@ -531,7 +531,7 @@
           <a:p>
             <a:fld id="{98AEBF78-ABB6-9F42-87DB-0ECE75CB3E53}" type="datetimeFigureOut">
               <a:rPr lang="en-US" smtClean="0"/>
-              <a:t>5/4/15</a:t>
+              <a:t>5/6/15</a:t>
             </a:fld>
             <a:endParaRPr lang="en-US"/>
           </a:p>
@@ -711,7 +711,7 @@
           <a:p>
             <a:fld id="{98AEBF78-ABB6-9F42-87DB-0ECE75CB3E53}" type="datetimeFigureOut">
               <a:rPr lang="en-US" smtClean="0"/>
-              <a:t>5/4/15</a:t>
+              <a:t>5/6/15</a:t>
             </a:fld>
             <a:endParaRPr lang="en-US"/>
           </a:p>
@@ -885,7 +885,7 @@
           <a:p>
             <a:fld id="{98AEBF78-ABB6-9F42-87DB-0ECE75CB3E53}" type="datetimeFigureOut">
               <a:rPr lang="en-US" smtClean="0"/>
-              <a:t>5/4/15</a:t>
+              <a:t>5/6/15</a:t>
             </a:fld>
             <a:endParaRPr lang="en-US"/>
           </a:p>
@@ -1131,7 +1131,7 @@
           <a:p>
             <a:fld id="{98AEBF78-ABB6-9F42-87DB-0ECE75CB3E53}" type="datetimeFigureOut">
               <a:rPr lang="en-US" smtClean="0"/>
-              <a:t>5/4/15</a:t>
+              <a:t>5/6/15</a:t>
             </a:fld>
             <a:endParaRPr lang="en-US"/>
           </a:p>
@@ -1419,7 +1419,7 @@
           <a:p>
             <a:fld id="{98AEBF78-ABB6-9F42-87DB-0ECE75CB3E53}" type="datetimeFigureOut">
               <a:rPr lang="en-US" smtClean="0"/>
-              <a:t>5/4/15</a:t>
+              <a:t>5/6/15</a:t>
             </a:fld>
             <a:endParaRPr lang="en-US"/>
           </a:p>
@@ -1841,7 +1841,7 @@
           <a:p>
             <a:fld id="{98AEBF78-ABB6-9F42-87DB-0ECE75CB3E53}" type="datetimeFigureOut">
               <a:rPr lang="en-US" smtClean="0"/>
-              <a:t>5/4/15</a:t>
+              <a:t>5/6/15</a:t>
             </a:fld>
             <a:endParaRPr lang="en-US"/>
           </a:p>
@@ -1959,7 +1959,7 @@
           <a:p>
             <a:fld id="{98AEBF78-ABB6-9F42-87DB-0ECE75CB3E53}" type="datetimeFigureOut">
               <a:rPr lang="en-US" smtClean="0"/>
-              <a:t>5/4/15</a:t>
+              <a:t>5/6/15</a:t>
             </a:fld>
             <a:endParaRPr lang="en-US"/>
           </a:p>
@@ -2054,7 +2054,7 @@
           <a:p>
             <a:fld id="{98AEBF78-ABB6-9F42-87DB-0ECE75CB3E53}" type="datetimeFigureOut">
               <a:rPr lang="en-US" smtClean="0"/>
-              <a:t>5/4/15</a:t>
+              <a:t>5/6/15</a:t>
             </a:fld>
             <a:endParaRPr lang="en-US"/>
           </a:p>
@@ -2331,7 +2331,7 @@
           <a:p>
             <a:fld id="{98AEBF78-ABB6-9F42-87DB-0ECE75CB3E53}" type="datetimeFigureOut">
               <a:rPr lang="en-US" smtClean="0"/>
-              <a:t>5/4/15</a:t>
+              <a:t>5/6/15</a:t>
             </a:fld>
             <a:endParaRPr lang="en-US"/>
           </a:p>
@@ -2584,7 +2584,7 @@
           <a:p>
             <a:fld id="{98AEBF78-ABB6-9F42-87DB-0ECE75CB3E53}" type="datetimeFigureOut">
               <a:rPr lang="en-US" smtClean="0"/>
-              <a:t>5/4/15</a:t>
+              <a:t>5/6/15</a:t>
             </a:fld>
             <a:endParaRPr lang="en-US"/>
           </a:p>
@@ -2852,7 +2852,7 @@
           <a:p>
             <a:fld id="{98AEBF78-ABB6-9F42-87DB-0ECE75CB3E53}" type="datetimeFigureOut">
               <a:rPr lang="en-US" smtClean="0"/>
-              <a:t>5/4/15</a:t>
+              <a:t>5/6/15</a:t>
             </a:fld>
             <a:endParaRPr lang="en-US"/>
           </a:p>
@@ -5901,32 +5901,45 @@
       </p:grpSpPr>
       <p:sp>
         <p:nvSpPr>
-          <p:cNvPr id="2" name="Rectangle 1"/>
+          <p:cNvPr id="6" name="Rectangle 5"/>
           <p:cNvSpPr/>
           <p:nvPr/>
         </p:nvSpPr>
         <p:spPr>
           <a:xfrm>
-            <a:off x="3441169" y="1002316"/>
-            <a:ext cx="2559850" cy="877571"/>
+            <a:off x="0" y="0"/>
+            <a:ext cx="9144000" cy="6800645"/>
           </a:xfrm>
           <a:prstGeom prst="rect">
             <a:avLst/>
           </a:prstGeom>
-          <a:noFill/>
+          <a:gradFill flip="none" rotWithShape="1">
+            <a:gsLst>
+              <a:gs pos="0">
+                <a:srgbClr val="C0504D"/>
+              </a:gs>
+              <a:gs pos="100000">
+                <a:schemeClr val="tx1"/>
+              </a:gs>
+            </a:gsLst>
+            <a:path path="circle">
+              <a:fillToRect l="50000" t="50000" r="50000" b="50000"/>
+            </a:path>
+            <a:tileRect/>
+          </a:gradFill>
         </p:spPr>
         <p:style>
-          <a:lnRef idx="2">
-            <a:schemeClr val="dk1"/>
+          <a:lnRef idx="1">
+            <a:schemeClr val="accent1"/>
           </a:lnRef>
-          <a:fillRef idx="1">
-            <a:schemeClr val="lt1"/>
+          <a:fillRef idx="3">
+            <a:schemeClr val="accent1"/>
           </a:fillRef>
-          <a:effectRef idx="0">
-            <a:schemeClr val="dk1"/>
+          <a:effectRef idx="2">
+            <a:schemeClr val="accent1"/>
           </a:effectRef>
           <a:fontRef idx="minor">
-            <a:schemeClr val="dk1"/>
+            <a:schemeClr val="lt1"/>
           </a:fontRef>
         </p:style>
         <p:txBody>
@@ -5934,452 +5947,145 @@
           <a:lstStyle/>
           <a:p>
             <a:pPr algn="ctr"/>
-            <a:r>
-              <a:rPr lang="en-US" sz="2000" dirty="0" smtClean="0">
-                <a:latin typeface="Anime Ace 2.0 BB"/>
-                <a:cs typeface="Anime Ace 2.0 BB"/>
-              </a:rPr>
-              <a:t>F</a:t>
-            </a:r>
-            <a:r>
-              <a:rPr lang="en-US" sz="1600" dirty="0" smtClean="0">
-                <a:latin typeface="Anime Ace 2.0 BB"/>
-                <a:cs typeface="Anime Ace 2.0 BB"/>
-              </a:rPr>
-              <a:t>lag</a:t>
-            </a:r>
-            <a:endParaRPr lang="en-US" sz="1600" dirty="0">
-              <a:latin typeface="Anime Ace 2.0 BB"/>
-              <a:cs typeface="Anime Ace 2.0 BB"/>
-            </a:endParaRPr>
-          </a:p>
-        </p:txBody>
-      </p:sp>
-      <p:grpSp>
-        <p:nvGrpSpPr>
-          <p:cNvPr id="18" name="Group 17"/>
-          <p:cNvGrpSpPr/>
-          <p:nvPr/>
-        </p:nvGrpSpPr>
-        <p:grpSpPr>
-          <a:xfrm>
-            <a:off x="3829937" y="2422346"/>
-            <a:ext cx="807865" cy="807865"/>
-            <a:chOff x="4754660" y="3753861"/>
-            <a:chExt cx="2235200" cy="2235200"/>
-          </a:xfrm>
-        </p:grpSpPr>
-        <p:sp>
-          <p:nvSpPr>
-            <p:cNvPr id="15" name="Shape 14"/>
-            <p:cNvSpPr/>
-            <p:nvPr/>
-          </p:nvSpPr>
-          <p:spPr>
-            <a:xfrm>
-              <a:off x="4754660" y="3753861"/>
-              <a:ext cx="2235200" cy="2235200"/>
-            </a:xfrm>
-            <a:prstGeom prst="gear9">
-              <a:avLst/>
-            </a:prstGeom>
-            <a:noFill/>
-          </p:spPr>
-          <p:style>
-            <a:lnRef idx="2">
-              <a:schemeClr val="dk1"/>
-            </a:lnRef>
-            <a:fillRef idx="1">
-              <a:schemeClr val="lt1"/>
-            </a:fillRef>
-            <a:effectRef idx="0">
-              <a:schemeClr val="dk1"/>
-            </a:effectRef>
-            <a:fontRef idx="minor">
-              <a:schemeClr val="dk1"/>
-            </a:fontRef>
-          </p:style>
-        </p:sp>
-        <p:sp>
-          <p:nvSpPr>
-            <p:cNvPr id="17" name="Oval 16"/>
-            <p:cNvSpPr/>
-            <p:nvPr/>
-          </p:nvSpPr>
-          <p:spPr>
-            <a:xfrm>
-              <a:off x="5562525" y="4561726"/>
-              <a:ext cx="619470" cy="619470"/>
-            </a:xfrm>
-            <a:prstGeom prst="ellipse">
-              <a:avLst/>
-            </a:prstGeom>
-            <a:noFill/>
-          </p:spPr>
-          <p:style>
-            <a:lnRef idx="2">
-              <a:schemeClr val="dk1"/>
-            </a:lnRef>
-            <a:fillRef idx="1">
-              <a:schemeClr val="lt1"/>
-            </a:fillRef>
-            <a:effectRef idx="0">
-              <a:schemeClr val="dk1"/>
-            </a:effectRef>
-            <a:fontRef idx="minor">
-              <a:schemeClr val="dk1"/>
-            </a:fontRef>
-          </p:style>
-          <p:txBody>
-            <a:bodyPr rtlCol="0" anchor="ctr"/>
-            <a:lstStyle/>
-            <a:p>
-              <a:pPr algn="ctr"/>
-              <a:endParaRPr lang="en-US"/>
-            </a:p>
-          </p:txBody>
-        </p:sp>
-      </p:grpSp>
-      <p:grpSp>
-        <p:nvGrpSpPr>
-          <p:cNvPr id="19" name="Group 18"/>
-          <p:cNvGrpSpPr/>
-          <p:nvPr/>
-        </p:nvGrpSpPr>
-        <p:grpSpPr>
-          <a:xfrm rot="900000">
-            <a:off x="4572196" y="2649705"/>
-            <a:ext cx="807865" cy="807865"/>
-            <a:chOff x="4754660" y="3753861"/>
-            <a:chExt cx="2235200" cy="2235200"/>
-          </a:xfrm>
-        </p:grpSpPr>
-        <p:sp>
-          <p:nvSpPr>
-            <p:cNvPr id="20" name="Shape 19"/>
-            <p:cNvSpPr/>
-            <p:nvPr/>
-          </p:nvSpPr>
-          <p:spPr>
-            <a:xfrm>
-              <a:off x="4754660" y="3753861"/>
-              <a:ext cx="2235200" cy="2235200"/>
-            </a:xfrm>
-            <a:prstGeom prst="gear9">
-              <a:avLst/>
-            </a:prstGeom>
-            <a:noFill/>
-          </p:spPr>
-          <p:style>
-            <a:lnRef idx="2">
-              <a:schemeClr val="dk1"/>
-            </a:lnRef>
-            <a:fillRef idx="1">
-              <a:schemeClr val="lt1"/>
-            </a:fillRef>
-            <a:effectRef idx="0">
-              <a:schemeClr val="dk1"/>
-            </a:effectRef>
-            <a:fontRef idx="minor">
-              <a:schemeClr val="dk1"/>
-            </a:fontRef>
-          </p:style>
-        </p:sp>
-        <p:sp>
-          <p:nvSpPr>
-            <p:cNvPr id="21" name="Oval 20"/>
-            <p:cNvSpPr/>
-            <p:nvPr/>
-          </p:nvSpPr>
-          <p:spPr>
-            <a:xfrm>
-              <a:off x="5562525" y="4561726"/>
-              <a:ext cx="619470" cy="619470"/>
-            </a:xfrm>
-            <a:prstGeom prst="ellipse">
-              <a:avLst/>
-            </a:prstGeom>
-            <a:noFill/>
-          </p:spPr>
-          <p:style>
-            <a:lnRef idx="2">
-              <a:schemeClr val="dk1"/>
-            </a:lnRef>
-            <a:fillRef idx="1">
-              <a:schemeClr val="lt1"/>
-            </a:fillRef>
-            <a:effectRef idx="0">
-              <a:schemeClr val="dk1"/>
-            </a:effectRef>
-            <a:fontRef idx="minor">
-              <a:schemeClr val="dk1"/>
-            </a:fontRef>
-          </p:style>
-          <p:txBody>
-            <a:bodyPr rtlCol="0" anchor="ctr"/>
-            <a:lstStyle/>
-            <a:p>
-              <a:pPr algn="ctr"/>
-              <a:endParaRPr lang="en-US"/>
-            </a:p>
-          </p:txBody>
-        </p:sp>
-      </p:grpSp>
-      <p:cxnSp>
-        <p:nvCxnSpPr>
-          <p:cNvPr id="24" name="Straight Arrow Connector 23"/>
-          <p:cNvCxnSpPr/>
-          <p:nvPr/>
-        </p:nvCxnSpPr>
-        <p:spPr>
-          <a:xfrm>
-            <a:off x="9249391" y="3139274"/>
-            <a:ext cx="0" cy="519142"/>
-          </a:xfrm>
-          <a:prstGeom prst="straightConnector1">
-            <a:avLst/>
-          </a:prstGeom>
-          <a:ln>
-            <a:tailEnd type="arrow" w="lg" len="lg"/>
-          </a:ln>
-          <a:effectLst/>
-        </p:spPr>
-        <p:style>
-          <a:lnRef idx="2">
-            <a:schemeClr val="dk1"/>
-          </a:lnRef>
-          <a:fillRef idx="0">
-            <a:schemeClr val="dk1"/>
-          </a:fillRef>
-          <a:effectRef idx="1">
-            <a:schemeClr val="dk1"/>
-          </a:effectRef>
-          <a:fontRef idx="minor">
-            <a:schemeClr val="tx1"/>
-          </a:fontRef>
-        </p:style>
-      </p:cxnSp>
-      <p:sp>
-        <p:nvSpPr>
-          <p:cNvPr id="29" name="Down Arrow 28"/>
-          <p:cNvSpPr/>
-          <p:nvPr/>
-        </p:nvSpPr>
-        <p:spPr>
-          <a:xfrm>
-            <a:off x="4443356" y="2039781"/>
-            <a:ext cx="550904" cy="519142"/>
-          </a:xfrm>
-          <a:prstGeom prst="downArrow">
+            <a:endParaRPr lang="en-US"/>
+          </a:p>
+        </p:txBody>
+      </p:sp>
+      <p:pic>
+        <p:nvPicPr>
+          <p:cNvPr id="2" name="Picture 1"/>
+          <p:cNvPicPr>
+            <a:picLocks noChangeAspect="1"/>
+          </p:cNvPicPr>
+          <p:nvPr/>
+        </p:nvPicPr>
+        <p:blipFill>
+          <a:blip r:embed="rId2"/>
+          <a:stretch>
+            <a:fillRect/>
+          </a:stretch>
+        </p:blipFill>
+        <p:spPr>
+          <a:xfrm rot="512769">
+            <a:off x="1323058" y="917812"/>
+            <a:ext cx="6475462" cy="5022376"/>
+          </a:xfrm>
+          <a:prstGeom prst="rect">
+            <a:avLst/>
+          </a:prstGeom>
+        </p:spPr>
+      </p:pic>
+      <p:sp>
+        <p:nvSpPr>
+          <p:cNvPr id="3" name="TextBox 2"/>
+          <p:cNvSpPr txBox="1"/>
+          <p:nvPr/>
+        </p:nvSpPr>
+        <p:spPr>
+          <a:xfrm rot="21198118">
+            <a:off x="265159" y="-21476"/>
+            <a:ext cx="4649208" cy="1899367"/>
+          </a:xfrm>
+          <a:prstGeom prst="rect">
             <a:avLst/>
           </a:prstGeom>
           <a:noFill/>
         </p:spPr>
-        <p:style>
-          <a:lnRef idx="2">
-            <a:schemeClr val="dk1"/>
-          </a:lnRef>
-          <a:fillRef idx="1">
-            <a:schemeClr val="lt1"/>
-          </a:fillRef>
-          <a:effectRef idx="0">
-            <a:schemeClr val="dk1"/>
-          </a:effectRef>
-          <a:fontRef idx="minor">
-            <a:schemeClr val="dk1"/>
-          </a:fontRef>
-        </p:style>
-        <p:txBody>
-          <a:bodyPr rtlCol="0" anchor="ctr"/>
-          <a:lstStyle/>
-          <a:p>
-            <a:pPr algn="ctr"/>
-            <a:endParaRPr lang="en-US"/>
-          </a:p>
-        </p:txBody>
-      </p:sp>
-      <p:sp>
-        <p:nvSpPr>
-          <p:cNvPr id="31" name="Down Arrow 30"/>
-          <p:cNvSpPr/>
-          <p:nvPr/>
-        </p:nvSpPr>
-        <p:spPr>
-          <a:xfrm>
-            <a:off x="4443356" y="3766022"/>
-            <a:ext cx="550904" cy="519142"/>
-          </a:xfrm>
-          <a:prstGeom prst="downArrow">
-            <a:avLst/>
-          </a:prstGeom>
-          <a:noFill/>
-        </p:spPr>
-        <p:style>
-          <a:lnRef idx="2">
-            <a:schemeClr val="dk1"/>
-          </a:lnRef>
-          <a:fillRef idx="1">
-            <a:schemeClr val="lt1"/>
-          </a:fillRef>
-          <a:effectRef idx="0">
-            <a:schemeClr val="dk1"/>
-          </a:effectRef>
-          <a:fontRef idx="minor">
-            <a:schemeClr val="dk1"/>
-          </a:fontRef>
-        </p:style>
-        <p:txBody>
-          <a:bodyPr rtlCol="0" anchor="ctr"/>
-          <a:lstStyle/>
-          <a:p>
-            <a:pPr algn="ctr"/>
-            <a:endParaRPr lang="en-US"/>
-          </a:p>
-        </p:txBody>
-      </p:sp>
-      <p:sp>
-        <p:nvSpPr>
-          <p:cNvPr id="34" name="Multidocument 33"/>
-          <p:cNvSpPr/>
-          <p:nvPr/>
-        </p:nvSpPr>
-        <p:spPr>
-          <a:xfrm>
-            <a:off x="4060272" y="4370326"/>
-            <a:ext cx="1327488" cy="948961"/>
-          </a:xfrm>
-          <a:prstGeom prst="flowChartMultidocument">
-            <a:avLst/>
-          </a:prstGeom>
-        </p:spPr>
-        <p:style>
-          <a:lnRef idx="2">
-            <a:schemeClr val="dk1"/>
-          </a:lnRef>
-          <a:fillRef idx="1">
-            <a:schemeClr val="lt1"/>
-          </a:fillRef>
-          <a:effectRef idx="0">
-            <a:schemeClr val="dk1"/>
-          </a:effectRef>
-          <a:fontRef idx="minor">
-            <a:schemeClr val="dk1"/>
-          </a:fontRef>
-        </p:style>
-        <p:txBody>
-          <a:bodyPr rtlCol="0" anchor="ctr"/>
-          <a:lstStyle/>
-          <a:p>
-            <a:pPr algn="ctr"/>
-            <a:endParaRPr lang="en-US"/>
-          </a:p>
-        </p:txBody>
-      </p:sp>
-      <p:sp>
-        <p:nvSpPr>
-          <p:cNvPr id="35" name="TextBox 34"/>
-          <p:cNvSpPr txBox="1"/>
-          <p:nvPr/>
-        </p:nvSpPr>
-        <p:spPr>
-          <a:xfrm>
-            <a:off x="3711234" y="5348568"/>
-            <a:ext cx="1923430" cy="369332"/>
-          </a:xfrm>
-          <a:prstGeom prst="rect">
-            <a:avLst/>
-          </a:prstGeom>
-          <a:noFill/>
-        </p:spPr>
         <p:txBody>
           <a:bodyPr wrap="square" rtlCol="0">
+            <a:prstTxWarp prst="textFadeRight">
+              <a:avLst>
+                <a:gd name="adj" fmla="val 25354"/>
+              </a:avLst>
+            </a:prstTxWarp>
             <a:spAutoFit/>
           </a:bodyPr>
           <a:lstStyle/>
           <a:p>
-            <a:pPr algn="ctr"/>
-            <a:r>
-              <a:rPr lang="en-US" dirty="0" smtClean="0">
-                <a:latin typeface="Anime Ace 2.0 BB"/>
-                <a:cs typeface="Anime Ace 2.0 BB"/>
-              </a:rPr>
-              <a:t>M</a:t>
-            </a:r>
-            <a:r>
-              <a:rPr lang="en-US" sz="1400" dirty="0" smtClean="0">
-                <a:latin typeface="Anime Ace 2.0 BB"/>
-                <a:cs typeface="Anime Ace 2.0 BB"/>
-              </a:rPr>
-              <a:t>anifest</a:t>
-            </a:r>
-            <a:endParaRPr lang="en-US" dirty="0">
-              <a:latin typeface="Anime Ace 2.0 BB"/>
-              <a:cs typeface="Anime Ace 2.0 BB"/>
+            <a:r>
+              <a:rPr lang="en-US" sz="4800" dirty="0" smtClean="0">
+                <a:ln w="12700" cmpd="sng">
+                  <a:solidFill>
+                    <a:schemeClr val="tx1"/>
+                  </a:solidFill>
+                </a:ln>
+                <a:solidFill>
+                  <a:schemeClr val="accent6">
+                    <a:lumMod val="75000"/>
+                  </a:schemeClr>
+                </a:solidFill>
+                <a:effectLst>
+                  <a:outerShdw dist="76200" dir="8100000" algn="tr" rotWithShape="0">
+                    <a:prstClr val="black">
+                      <a:alpha val="64000"/>
+                    </a:prstClr>
+                  </a:outerShdw>
+                </a:effectLst>
+                <a:latin typeface="Adventure"/>
+                <a:cs typeface="Adventure"/>
+              </a:rPr>
+              <a:t>It came from</a:t>
+            </a:r>
+          </a:p>
+          <a:p>
+            <a:r>
+              <a:rPr lang="en-US" sz="4800" dirty="0" smtClean="0">
+                <a:ln w="12700" cmpd="sng">
+                  <a:solidFill>
+                    <a:schemeClr val="tx1"/>
+                  </a:solidFill>
+                </a:ln>
+                <a:solidFill>
+                  <a:schemeClr val="accent6">
+                    <a:lumMod val="75000"/>
+                  </a:schemeClr>
+                </a:solidFill>
+                <a:effectLst>
+                  <a:outerShdw dist="76200" dir="8100000" algn="tr" rotWithShape="0">
+                    <a:prstClr val="black">
+                      <a:alpha val="64000"/>
+                    </a:prstClr>
+                  </a:outerShdw>
+                </a:effectLst>
+                <a:latin typeface="Adventure"/>
+                <a:cs typeface="Adventure"/>
+              </a:rPr>
+              <a:t>OPEN SOURCE,,,</a:t>
+            </a:r>
+            <a:endParaRPr lang="en-US" sz="4800" dirty="0">
+              <a:ln w="12700" cmpd="sng">
+                <a:solidFill>
+                  <a:schemeClr val="tx1"/>
+                </a:solidFill>
+              </a:ln>
+              <a:solidFill>
+                <a:schemeClr val="accent6">
+                  <a:lumMod val="75000"/>
+                </a:schemeClr>
+              </a:solidFill>
+              <a:effectLst>
+                <a:outerShdw dist="76200" dir="8100000" algn="tr" rotWithShape="0">
+                  <a:prstClr val="black">
+                    <a:alpha val="64000"/>
+                  </a:prstClr>
+                </a:outerShdw>
+              </a:effectLst>
+              <a:latin typeface="Adventure"/>
+              <a:cs typeface="Adventure"/>
             </a:endParaRPr>
           </a:p>
         </p:txBody>
       </p:sp>
       <p:sp>
         <p:nvSpPr>
-          <p:cNvPr id="36" name="Oval Callout 35"/>
-          <p:cNvSpPr/>
-          <p:nvPr/>
-        </p:nvSpPr>
-        <p:spPr>
-          <a:xfrm>
-            <a:off x="5733301" y="2422346"/>
-            <a:ext cx="1661645" cy="935861"/>
-          </a:xfrm>
-          <a:prstGeom prst="wedgeEllipseCallout">
-            <a:avLst>
-              <a:gd name="adj1" fmla="val -69806"/>
-              <a:gd name="adj2" fmla="val 5851"/>
-            </a:avLst>
-          </a:prstGeom>
-        </p:spPr>
-        <p:style>
-          <a:lnRef idx="2">
-            <a:schemeClr val="dk1"/>
-          </a:lnRef>
-          <a:fillRef idx="1">
-            <a:schemeClr val="lt1"/>
-          </a:fillRef>
-          <a:effectRef idx="0">
-            <a:schemeClr val="dk1"/>
-          </a:effectRef>
-          <a:fontRef idx="minor">
-            <a:schemeClr val="dk1"/>
-          </a:fontRef>
-        </p:style>
-        <p:txBody>
-          <a:bodyPr rtlCol="0" anchor="ctr"/>
-          <a:lstStyle/>
-          <a:p>
-            <a:pPr algn="ctr"/>
-            <a:r>
-              <a:rPr lang="en-US" sz="1400" dirty="0" smtClean="0">
-                <a:latin typeface="Anime Ace 2.0 BB"/>
-                <a:cs typeface="Anime Ace 2.0 BB"/>
-              </a:rPr>
-              <a:t>Costs Memory, CPU</a:t>
-            </a:r>
-            <a:endParaRPr lang="en-US" sz="1400" dirty="0">
-              <a:latin typeface="Anime Ace 2.0 BB"/>
-              <a:cs typeface="Anime Ace 2.0 BB"/>
-            </a:endParaRPr>
-          </a:p>
-        </p:txBody>
-      </p:sp>
-      <p:sp>
-        <p:nvSpPr>
-          <p:cNvPr id="37" name="TextBox 36"/>
+          <p:cNvPr id="5" name="TextBox 4"/>
           <p:cNvSpPr txBox="1"/>
           <p:nvPr/>
         </p:nvSpPr>
         <p:spPr>
-          <a:xfrm>
-            <a:off x="3715674" y="3363686"/>
-            <a:ext cx="1923430" cy="369332"/>
+          <a:xfrm rot="21198118">
+            <a:off x="4948321" y="4283931"/>
+            <a:ext cx="4201262" cy="2679222"/>
           </a:xfrm>
           <a:prstGeom prst="rect">
             <a:avLst/>
@@ -6388,21 +6094,131 @@
         </p:spPr>
         <p:txBody>
           <a:bodyPr wrap="square" rtlCol="0">
+            <a:prstTxWarp prst="textFadeLeft">
+              <a:avLst>
+                <a:gd name="adj" fmla="val 20373"/>
+              </a:avLst>
+            </a:prstTxWarp>
             <a:spAutoFit/>
           </a:bodyPr>
           <a:lstStyle/>
           <a:p>
-            <a:pPr algn="ctr"/>
-            <a:r>
-              <a:rPr lang="en-US" dirty="0" smtClean="0">
-                <a:latin typeface="Anime Ace 2.0 BB"/>
-                <a:cs typeface="Anime Ace 2.0 BB"/>
-              </a:rPr>
-              <a:t>PHP</a:t>
-            </a:r>
-            <a:endParaRPr lang="en-US" dirty="0">
-              <a:latin typeface="Anime Ace 2.0 BB"/>
-              <a:cs typeface="Anime Ace 2.0 BB"/>
+            <a:r>
+              <a:rPr lang="en-US" sz="4800" dirty="0" smtClean="0">
+                <a:ln w="12700" cmpd="sng">
+                  <a:solidFill>
+                    <a:schemeClr val="tx1"/>
+                  </a:solidFill>
+                </a:ln>
+                <a:solidFill>
+                  <a:schemeClr val="accent6">
+                    <a:lumMod val="75000"/>
+                  </a:schemeClr>
+                </a:solidFill>
+                <a:effectLst>
+                  <a:outerShdw dist="76200" dir="8100000" algn="tr" rotWithShape="0">
+                    <a:prstClr val="black">
+                      <a:alpha val="64000"/>
+                    </a:prstClr>
+                  </a:outerShdw>
+                </a:effectLst>
+                <a:latin typeface="Adventure"/>
+                <a:cs typeface="Adventure"/>
+              </a:rPr>
+              <a:t>TO </a:t>
+            </a:r>
+            <a:r>
+              <a:rPr lang="en-US" sz="4800" b="1" u="sng" dirty="0" smtClean="0">
+                <a:ln w="12700" cmpd="sng">
+                  <a:solidFill>
+                    <a:schemeClr val="tx1"/>
+                  </a:solidFill>
+                </a:ln>
+                <a:solidFill>
+                  <a:schemeClr val="accent6">
+                    <a:lumMod val="75000"/>
+                  </a:schemeClr>
+                </a:solidFill>
+                <a:effectLst>
+                  <a:outerShdw dist="76200" dir="8100000" algn="tr" rotWithShape="0">
+                    <a:prstClr val="black">
+                      <a:alpha val="64000"/>
+                    </a:prstClr>
+                  </a:outerShdw>
+                </a:effectLst>
+                <a:latin typeface="Adventure"/>
+                <a:cs typeface="Adventure"/>
+              </a:rPr>
+              <a:t>DEVOUR</a:t>
+            </a:r>
+            <a:r>
+              <a:rPr lang="en-US" sz="4800" dirty="0" smtClean="0">
+                <a:ln w="12700" cmpd="sng">
+                  <a:solidFill>
+                    <a:schemeClr val="tx1"/>
+                  </a:solidFill>
+                </a:ln>
+                <a:solidFill>
+                  <a:schemeClr val="accent6">
+                    <a:lumMod val="75000"/>
+                  </a:schemeClr>
+                </a:solidFill>
+                <a:effectLst>
+                  <a:outerShdw dist="76200" dir="8100000" algn="tr" rotWithShape="0">
+                    <a:prstClr val="black">
+                      <a:alpha val="64000"/>
+                    </a:prstClr>
+                  </a:outerShdw>
+                </a:effectLst>
+                <a:latin typeface="Adventure"/>
+                <a:cs typeface="Adventure"/>
+              </a:rPr>
+              <a:t> </a:t>
+            </a:r>
+            <a:r>
+              <a:rPr lang="en-US" sz="8800" dirty="0" smtClean="0">
+                <a:ln w="12700" cmpd="sng">
+                  <a:solidFill>
+                    <a:schemeClr val="tx1"/>
+                  </a:solidFill>
+                </a:ln>
+                <a:solidFill>
+                  <a:schemeClr val="accent6">
+                    <a:lumMod val="75000"/>
+                  </a:schemeClr>
+                </a:solidFill>
+                <a:effectLst>
+                  <a:outerShdw dist="76200" dir="8100000" algn="tr" rotWithShape="0">
+                    <a:prstClr val="black">
+                      <a:alpha val="64000"/>
+                    </a:prstClr>
+                  </a:outerShdw>
+                </a:effectLst>
+                <a:latin typeface="Adventure"/>
+                <a:cs typeface="Adventure"/>
+              </a:rPr>
+              <a:t>L.A. !!!</a:t>
+            </a:r>
+            <a:endParaRPr lang="en-US" sz="4800" dirty="0">
+              <a:ln w="12700" cmpd="sng">
+                <a:solidFill>
+                  <a:schemeClr val="tx1"/>
+                </a:solidFill>
+              </a:ln>
+              <a:solidFill>
+                <a:schemeClr val="accent6">
+                  <a:lumMod val="75000"/>
+                </a:schemeClr>
+              </a:solidFill>
+              <a:effectLst>
+                <a:outerShdw dist="76200" dir="8100000" algn="tr" rotWithShape="0">
+                  <a:prstClr val="black">
+                    <a:alpha val="64000"/>
+                  </a:prstClr>
+                </a:outerShdw>
+              </a:effectLst>
+              <a:latin typeface="Adventure"/>
+              <a:cs typeface="Adventure"/>
             </a:endParaRPr>
           </a:p>
         </p:txBody>
@@ -6410,20 +6226,13 @@
     </p:spTree>
     <p:extLst>
       <p:ext uri="{BB962C8B-B14F-4D97-AF65-F5344CB8AC3E}">
-        <p14:creationId xmlns:p14="http://schemas.microsoft.com/office/powerpoint/2010/main" val="1073290588"/>
+        <p14:creationId xmlns:p14="http://schemas.microsoft.com/office/powerpoint/2010/main" val="4136508059"/>
       </p:ext>
     </p:extLst>
   </p:cSld>
   <p:clrMapOvr>
     <a:masterClrMapping/>
   </p:clrMapOvr>
-  <p:timing>
-    <p:tnLst>
-      <p:par>
-        <p:cTn xmlns:p14="http://schemas.microsoft.com/office/powerpoint/2010/main" id="1" dur="indefinite" restart="never" nodeType="tmRoot"/>
-      </p:par>
-    </p:tnLst>
-  </p:timing>
 </p:sld>
 </file>
 

</xml_diff>

<commit_message>
Updated the Powerpoint deck.
</commit_message>
<xml_diff>
--- a/src/flagOnD8.pptx
+++ b/src/flagOnD8.pptx
@@ -3319,6 +3319,16 @@
         </p:nvPicPr>
         <p:blipFill rotWithShape="1">
           <a:blip r:embed="rId3">
+            <a:clrChange>
+              <a:clrFrom>
+                <a:srgbClr val="FCFCFC"/>
+              </a:clrFrom>
+              <a:clrTo>
+                <a:srgbClr val="FCFCFC">
+                  <a:alpha val="0"/>
+                </a:srgbClr>
+              </a:clrTo>
+            </a:clrChange>
             <a:alphaModFix amt="24000"/>
             <a:extLst>
               <a:ext uri="{BEBA8EAE-BF5A-486C-A8C5-ECC9F3942E4B}">

</xml_diff>